<commit_message>
added color to the setup diagrams
</commit_message>
<xml_diff>
--- a/images/udp/graphics.pptx
+++ b/images/udp/graphics.pptx
@@ -246,7 +246,7 @@
           <a:p>
             <a:fld id="{D4F531F3-2A0A-480B-8977-C4D3915E765A}" type="datetimeFigureOut">
               <a:rPr lang="en-US" smtClean="0"/>
-              <a:t>11/9/2016</a:t>
+              <a:t>11/12/2016</a:t>
             </a:fld>
             <a:endParaRPr lang="en-US"/>
           </a:p>
@@ -416,7 +416,7 @@
           <a:p>
             <a:fld id="{D4F531F3-2A0A-480B-8977-C4D3915E765A}" type="datetimeFigureOut">
               <a:rPr lang="en-US" smtClean="0"/>
-              <a:t>11/9/2016</a:t>
+              <a:t>11/12/2016</a:t>
             </a:fld>
             <a:endParaRPr lang="en-US"/>
           </a:p>
@@ -596,7 +596,7 @@
           <a:p>
             <a:fld id="{D4F531F3-2A0A-480B-8977-C4D3915E765A}" type="datetimeFigureOut">
               <a:rPr lang="en-US" smtClean="0"/>
-              <a:t>11/9/2016</a:t>
+              <a:t>11/12/2016</a:t>
             </a:fld>
             <a:endParaRPr lang="en-US"/>
           </a:p>
@@ -766,7 +766,7 @@
           <a:p>
             <a:fld id="{D4F531F3-2A0A-480B-8977-C4D3915E765A}" type="datetimeFigureOut">
               <a:rPr lang="en-US" smtClean="0"/>
-              <a:t>11/9/2016</a:t>
+              <a:t>11/12/2016</a:t>
             </a:fld>
             <a:endParaRPr lang="en-US"/>
           </a:p>
@@ -1012,7 +1012,7 @@
           <a:p>
             <a:fld id="{D4F531F3-2A0A-480B-8977-C4D3915E765A}" type="datetimeFigureOut">
               <a:rPr lang="en-US" smtClean="0"/>
-              <a:t>11/9/2016</a:t>
+              <a:t>11/12/2016</a:t>
             </a:fld>
             <a:endParaRPr lang="en-US"/>
           </a:p>
@@ -1244,7 +1244,7 @@
           <a:p>
             <a:fld id="{D4F531F3-2A0A-480B-8977-C4D3915E765A}" type="datetimeFigureOut">
               <a:rPr lang="en-US" smtClean="0"/>
-              <a:t>11/9/2016</a:t>
+              <a:t>11/12/2016</a:t>
             </a:fld>
             <a:endParaRPr lang="en-US"/>
           </a:p>
@@ -1611,7 +1611,7 @@
           <a:p>
             <a:fld id="{D4F531F3-2A0A-480B-8977-C4D3915E765A}" type="datetimeFigureOut">
               <a:rPr lang="en-US" smtClean="0"/>
-              <a:t>11/9/2016</a:t>
+              <a:t>11/12/2016</a:t>
             </a:fld>
             <a:endParaRPr lang="en-US"/>
           </a:p>
@@ -1729,7 +1729,7 @@
           <a:p>
             <a:fld id="{D4F531F3-2A0A-480B-8977-C4D3915E765A}" type="datetimeFigureOut">
               <a:rPr lang="en-US" smtClean="0"/>
-              <a:t>11/9/2016</a:t>
+              <a:t>11/12/2016</a:t>
             </a:fld>
             <a:endParaRPr lang="en-US"/>
           </a:p>
@@ -1824,7 +1824,7 @@
           <a:p>
             <a:fld id="{D4F531F3-2A0A-480B-8977-C4D3915E765A}" type="datetimeFigureOut">
               <a:rPr lang="en-US" smtClean="0"/>
-              <a:t>11/9/2016</a:t>
+              <a:t>11/12/2016</a:t>
             </a:fld>
             <a:endParaRPr lang="en-US"/>
           </a:p>
@@ -2101,7 +2101,7 @@
           <a:p>
             <a:fld id="{D4F531F3-2A0A-480B-8977-C4D3915E765A}" type="datetimeFigureOut">
               <a:rPr lang="en-US" smtClean="0"/>
-              <a:t>11/9/2016</a:t>
+              <a:t>11/12/2016</a:t>
             </a:fld>
             <a:endParaRPr lang="en-US"/>
           </a:p>
@@ -2358,7 +2358,7 @@
           <a:p>
             <a:fld id="{D4F531F3-2A0A-480B-8977-C4D3915E765A}" type="datetimeFigureOut">
               <a:rPr lang="en-US" smtClean="0"/>
-              <a:t>11/9/2016</a:t>
+              <a:t>11/12/2016</a:t>
             </a:fld>
             <a:endParaRPr lang="en-US"/>
           </a:p>
@@ -2571,7 +2571,7 @@
           <a:p>
             <a:fld id="{D4F531F3-2A0A-480B-8977-C4D3915E765A}" type="datetimeFigureOut">
               <a:rPr lang="en-US" smtClean="0"/>
-              <a:t>11/9/2016</a:t>
+              <a:t>11/12/2016</a:t>
             </a:fld>
             <a:endParaRPr lang="en-US"/>
           </a:p>
@@ -3994,20 +3994,26 @@
           <a:prstGeom prst="rect">
             <a:avLst/>
           </a:prstGeom>
-          <a:ln/>
+          <a:ln>
+            <a:solidFill>
+              <a:schemeClr val="tx1"/>
+            </a:solidFill>
+          </a:ln>
         </p:spPr>
         <p:style>
           <a:lnRef idx="2">
-            <a:schemeClr val="dk1"/>
+            <a:schemeClr val="accent4">
+              <a:shade val="50000"/>
+            </a:schemeClr>
           </a:lnRef>
           <a:fillRef idx="1">
-            <a:schemeClr val="lt1"/>
+            <a:schemeClr val="accent4"/>
           </a:fillRef>
           <a:effectRef idx="0">
-            <a:schemeClr val="dk1"/>
+            <a:schemeClr val="accent4"/>
           </a:effectRef>
           <a:fontRef idx="minor">
-            <a:schemeClr val="dk1"/>
+            <a:schemeClr val="lt1"/>
           </a:fontRef>
         </p:style>
         <p:txBody>
@@ -4072,20 +4078,26 @@
           <a:prstGeom prst="rect">
             <a:avLst/>
           </a:prstGeom>
-          <a:ln/>
+          <a:ln>
+            <a:solidFill>
+              <a:schemeClr val="tx1"/>
+            </a:solidFill>
+          </a:ln>
         </p:spPr>
         <p:style>
           <a:lnRef idx="2">
-            <a:schemeClr val="dk1"/>
+            <a:schemeClr val="accent6">
+              <a:shade val="50000"/>
+            </a:schemeClr>
           </a:lnRef>
           <a:fillRef idx="1">
-            <a:schemeClr val="lt1"/>
+            <a:schemeClr val="accent6"/>
           </a:fillRef>
           <a:effectRef idx="0">
-            <a:schemeClr val="dk1"/>
+            <a:schemeClr val="accent6"/>
           </a:effectRef>
           <a:fontRef idx="minor">
-            <a:schemeClr val="dk1"/>
+            <a:schemeClr val="lt1"/>
           </a:fontRef>
         </p:style>
         <p:txBody>
@@ -4104,7 +4116,7 @@
                   <a:schemeClr val="tx1"/>
                 </a:solidFill>
               </a:rPr>
-              <a:t>UDP Sender</a:t>
+              <a:t>Sender Node</a:t>
             </a:r>
           </a:p>
           <a:p>
@@ -4134,20 +4146,26 @@
           <a:prstGeom prst="rect">
             <a:avLst/>
           </a:prstGeom>
-          <a:ln/>
+          <a:ln>
+            <a:solidFill>
+              <a:schemeClr val="tx1"/>
+            </a:solidFill>
+          </a:ln>
         </p:spPr>
         <p:style>
           <a:lnRef idx="2">
-            <a:schemeClr val="dk1"/>
+            <a:schemeClr val="accent1">
+              <a:shade val="50000"/>
+            </a:schemeClr>
           </a:lnRef>
           <a:fillRef idx="1">
-            <a:schemeClr val="lt1"/>
+            <a:schemeClr val="accent1"/>
           </a:fillRef>
           <a:effectRef idx="0">
-            <a:schemeClr val="dk1"/>
+            <a:schemeClr val="accent1"/>
           </a:effectRef>
           <a:fontRef idx="minor">
-            <a:schemeClr val="dk1"/>
+            <a:schemeClr val="lt1"/>
           </a:fontRef>
         </p:style>
         <p:txBody>
@@ -4166,7 +4184,7 @@
                   <a:schemeClr val="tx1"/>
                 </a:solidFill>
               </a:rPr>
-              <a:t>UDP Echo</a:t>
+              <a:t>Receiver Node</a:t>
             </a:r>
           </a:p>
           <a:p>
@@ -4196,20 +4214,26 @@
           <a:prstGeom prst="rect">
             <a:avLst/>
           </a:prstGeom>
-          <a:ln/>
+          <a:ln>
+            <a:solidFill>
+              <a:schemeClr val="tx1"/>
+            </a:solidFill>
+          </a:ln>
         </p:spPr>
         <p:style>
           <a:lnRef idx="2">
-            <a:schemeClr val="dk1"/>
+            <a:schemeClr val="accent2">
+              <a:shade val="50000"/>
+            </a:schemeClr>
           </a:lnRef>
           <a:fillRef idx="1">
-            <a:schemeClr val="lt1"/>
+            <a:schemeClr val="accent2"/>
           </a:fillRef>
           <a:effectRef idx="0">
-            <a:schemeClr val="dk1"/>
+            <a:schemeClr val="accent2"/>
           </a:effectRef>
           <a:fontRef idx="minor">
-            <a:schemeClr val="dk1"/>
+            <a:schemeClr val="lt1"/>
           </a:fontRef>
         </p:style>
         <p:txBody>
@@ -4456,6 +4480,437 @@
           </a:p>
         </p:txBody>
       </p:sp>
+      <p:grpSp>
+        <p:nvGrpSpPr>
+          <p:cNvPr id="20" name="Group 19"/>
+          <p:cNvGrpSpPr/>
+          <p:nvPr/>
+        </p:nvGrpSpPr>
+        <p:grpSpPr>
+          <a:xfrm>
+            <a:off x="10007069" y="255040"/>
+            <a:ext cx="1132114" cy="2049545"/>
+            <a:chOff x="10007069" y="255040"/>
+            <a:chExt cx="1132114" cy="2049545"/>
+          </a:xfrm>
+        </p:grpSpPr>
+        <p:sp>
+          <p:nvSpPr>
+            <p:cNvPr id="13" name="Rectangle 12"/>
+            <p:cNvSpPr/>
+            <p:nvPr/>
+          </p:nvSpPr>
+          <p:spPr>
+            <a:xfrm>
+              <a:off x="10007069" y="255040"/>
+              <a:ext cx="1132114" cy="2049545"/>
+            </a:xfrm>
+            <a:prstGeom prst="rect">
+              <a:avLst/>
+            </a:prstGeom>
+            <a:noFill/>
+          </p:spPr>
+          <p:style>
+            <a:lnRef idx="2">
+              <a:schemeClr val="dk1">
+                <a:shade val="50000"/>
+              </a:schemeClr>
+            </a:lnRef>
+            <a:fillRef idx="1">
+              <a:schemeClr val="dk1"/>
+            </a:fillRef>
+            <a:effectRef idx="0">
+              <a:schemeClr val="dk1"/>
+            </a:effectRef>
+            <a:fontRef idx="minor">
+              <a:schemeClr val="lt1"/>
+            </a:fontRef>
+          </p:style>
+          <p:txBody>
+            <a:bodyPr rot="0" spcFirstLastPara="0" vertOverflow="overflow" horzOverflow="overflow" vert="horz" wrap="square" lIns="91440" tIns="45720" rIns="91440" bIns="45720" numCol="1" spcCol="0" rtlCol="0" fromWordArt="0" anchor="ctr" anchorCtr="0" forceAA="0" compatLnSpc="1">
+              <a:prstTxWarp prst="textNoShape">
+                <a:avLst/>
+              </a:prstTxWarp>
+              <a:noAutofit/>
+            </a:bodyPr>
+            <a:lstStyle/>
+            <a:p>
+              <a:pPr algn="ctr"/>
+              <a:endParaRPr lang="en-US"/>
+            </a:p>
+          </p:txBody>
+        </p:sp>
+        <p:sp>
+          <p:nvSpPr>
+            <p:cNvPr id="14" name="Rectangle 13"/>
+            <p:cNvSpPr/>
+            <p:nvPr/>
+          </p:nvSpPr>
+          <p:spPr>
+            <a:xfrm>
+              <a:off x="10171094" y="373521"/>
+              <a:ext cx="798692" cy="280111"/>
+            </a:xfrm>
+            <a:prstGeom prst="rect">
+              <a:avLst/>
+            </a:prstGeom>
+            <a:ln>
+              <a:solidFill>
+                <a:schemeClr val="tx1"/>
+              </a:solidFill>
+            </a:ln>
+          </p:spPr>
+          <p:style>
+            <a:lnRef idx="2">
+              <a:schemeClr val="accent4">
+                <a:shade val="50000"/>
+              </a:schemeClr>
+            </a:lnRef>
+            <a:fillRef idx="1">
+              <a:schemeClr val="accent4"/>
+            </a:fillRef>
+            <a:effectRef idx="0">
+              <a:schemeClr val="accent4"/>
+            </a:effectRef>
+            <a:fontRef idx="minor">
+              <a:schemeClr val="lt1"/>
+            </a:fontRef>
+          </p:style>
+          <p:txBody>
+            <a:bodyPr rot="0" spcFirstLastPara="0" vertOverflow="overflow" horzOverflow="overflow" vert="horz" wrap="square" lIns="91440" tIns="45720" rIns="91440" bIns="45720" numCol="1" spcCol="0" rtlCol="0" fromWordArt="0" anchor="ctr" anchorCtr="0" forceAA="0" compatLnSpc="1">
+              <a:prstTxWarp prst="textNoShape">
+                <a:avLst/>
+              </a:prstTxWarp>
+              <a:noAutofit/>
+            </a:bodyPr>
+            <a:lstStyle/>
+            <a:p>
+              <a:pPr algn="ctr"/>
+              <a:r>
+                <a:rPr lang="en-US" sz="1600" dirty="0">
+                  <a:solidFill>
+                    <a:schemeClr val="tx1"/>
+                  </a:solidFill>
+                </a:rPr>
+                <a:t>Switch</a:t>
+              </a:r>
+            </a:p>
+          </p:txBody>
+        </p:sp>
+        <p:sp>
+          <p:nvSpPr>
+            <p:cNvPr id="15" name="Rectangle 14"/>
+            <p:cNvSpPr/>
+            <p:nvPr/>
+          </p:nvSpPr>
+          <p:spPr>
+            <a:xfrm>
+              <a:off x="10171094" y="696356"/>
+              <a:ext cx="802602" cy="280111"/>
+            </a:xfrm>
+            <a:prstGeom prst="rect">
+              <a:avLst/>
+            </a:prstGeom>
+            <a:ln>
+              <a:solidFill>
+                <a:schemeClr val="tx1"/>
+              </a:solidFill>
+            </a:ln>
+          </p:spPr>
+          <p:style>
+            <a:lnRef idx="2">
+              <a:schemeClr val="accent6">
+                <a:shade val="50000"/>
+              </a:schemeClr>
+            </a:lnRef>
+            <a:fillRef idx="1">
+              <a:schemeClr val="accent6"/>
+            </a:fillRef>
+            <a:effectRef idx="0">
+              <a:schemeClr val="accent6"/>
+            </a:effectRef>
+            <a:fontRef idx="minor">
+              <a:schemeClr val="lt1"/>
+            </a:fontRef>
+          </p:style>
+          <p:txBody>
+            <a:bodyPr rot="0" spcFirstLastPara="0" vertOverflow="overflow" horzOverflow="overflow" vert="horz" wrap="square" lIns="91440" tIns="45720" rIns="91440" bIns="45720" numCol="1" spcCol="0" rtlCol="0" fromWordArt="0" anchor="ctr" anchorCtr="0" forceAA="0" compatLnSpc="1">
+              <a:prstTxWarp prst="textNoShape">
+                <a:avLst/>
+              </a:prstTxWarp>
+              <a:noAutofit/>
+            </a:bodyPr>
+            <a:lstStyle/>
+            <a:p>
+              <a:pPr algn="ctr"/>
+              <a:r>
+                <a:rPr lang="en-US" sz="1600" dirty="0">
+                  <a:solidFill>
+                    <a:schemeClr val="tx1"/>
+                  </a:solidFill>
+                </a:rPr>
+                <a:t>Source</a:t>
+              </a:r>
+            </a:p>
+          </p:txBody>
+        </p:sp>
+        <p:sp>
+          <p:nvSpPr>
+            <p:cNvPr id="16" name="Rectangle 15"/>
+            <p:cNvSpPr/>
+            <p:nvPr/>
+          </p:nvSpPr>
+          <p:spPr>
+            <a:xfrm>
+              <a:off x="10171094" y="1019192"/>
+              <a:ext cx="801810" cy="280111"/>
+            </a:xfrm>
+            <a:prstGeom prst="rect">
+              <a:avLst/>
+            </a:prstGeom>
+            <a:ln>
+              <a:solidFill>
+                <a:schemeClr val="tx1"/>
+              </a:solidFill>
+            </a:ln>
+          </p:spPr>
+          <p:style>
+            <a:lnRef idx="2">
+              <a:schemeClr val="accent1">
+                <a:shade val="50000"/>
+              </a:schemeClr>
+            </a:lnRef>
+            <a:fillRef idx="1">
+              <a:schemeClr val="accent1"/>
+            </a:fillRef>
+            <a:effectRef idx="0">
+              <a:schemeClr val="accent1"/>
+            </a:effectRef>
+            <a:fontRef idx="minor">
+              <a:schemeClr val="lt1"/>
+            </a:fontRef>
+          </p:style>
+          <p:txBody>
+            <a:bodyPr rot="0" spcFirstLastPara="0" vertOverflow="overflow" horzOverflow="overflow" vert="horz" wrap="square" lIns="91440" tIns="45720" rIns="91440" bIns="45720" numCol="1" spcCol="0" rtlCol="0" fromWordArt="0" anchor="ctr" anchorCtr="0" forceAA="0" compatLnSpc="1">
+              <a:prstTxWarp prst="textNoShape">
+                <a:avLst/>
+              </a:prstTxWarp>
+              <a:noAutofit/>
+            </a:bodyPr>
+            <a:lstStyle/>
+            <a:p>
+              <a:pPr algn="ctr"/>
+              <a:r>
+                <a:rPr lang="en-US" sz="1600" dirty="0">
+                  <a:solidFill>
+                    <a:schemeClr val="tx1"/>
+                  </a:solidFill>
+                </a:rPr>
+                <a:t>Target</a:t>
+              </a:r>
+            </a:p>
+          </p:txBody>
+        </p:sp>
+        <p:sp>
+          <p:nvSpPr>
+            <p:cNvPr id="17" name="TextBox 16"/>
+            <p:cNvSpPr txBox="1"/>
+            <p:nvPr/>
+          </p:nvSpPr>
+          <p:spPr>
+            <a:xfrm>
+              <a:off x="10037625" y="1618137"/>
+              <a:ext cx="1071001" cy="307777"/>
+            </a:xfrm>
+            <a:prstGeom prst="rect">
+              <a:avLst/>
+            </a:prstGeom>
+            <a:noFill/>
+          </p:spPr>
+          <p:txBody>
+            <a:bodyPr wrap="square" rtlCol="0">
+              <a:spAutoFit/>
+            </a:bodyPr>
+            <a:lstStyle/>
+            <a:p>
+              <a:pPr algn="ctr"/>
+              <a:r>
+                <a:rPr lang="en-US" sz="1400" dirty="0"/>
+                <a:t>100 Mbit/s</a:t>
+              </a:r>
+              <a:endParaRPr lang="en-US" dirty="0"/>
+            </a:p>
+          </p:txBody>
+        </p:sp>
+        <p:cxnSp>
+          <p:nvCxnSpPr>
+            <p:cNvPr id="18" name="Straight Connector 17"/>
+            <p:cNvCxnSpPr/>
+            <p:nvPr/>
+          </p:nvCxnSpPr>
+          <p:spPr>
+            <a:xfrm flipV="1">
+              <a:off x="10207084" y="2169906"/>
+              <a:ext cx="710664" cy="6592"/>
+            </a:xfrm>
+            <a:prstGeom prst="line">
+              <a:avLst/>
+            </a:prstGeom>
+            <a:ln w="38100">
+              <a:solidFill>
+                <a:schemeClr val="tx1"/>
+              </a:solidFill>
+              <a:prstDash val="dash"/>
+            </a:ln>
+          </p:spPr>
+          <p:style>
+            <a:lnRef idx="1">
+              <a:schemeClr val="dk1"/>
+            </a:lnRef>
+            <a:fillRef idx="0">
+              <a:schemeClr val="dk1"/>
+            </a:fillRef>
+            <a:effectRef idx="0">
+              <a:schemeClr val="dk1"/>
+            </a:effectRef>
+            <a:fontRef idx="minor">
+              <a:schemeClr val="tx1"/>
+            </a:fontRef>
+          </p:style>
+        </p:cxnSp>
+        <p:cxnSp>
+          <p:nvCxnSpPr>
+            <p:cNvPr id="19" name="Straight Connector 18"/>
+            <p:cNvCxnSpPr/>
+            <p:nvPr/>
+          </p:nvCxnSpPr>
+          <p:spPr>
+            <a:xfrm>
+              <a:off x="10160496" y="1880426"/>
+              <a:ext cx="809290" cy="1"/>
+            </a:xfrm>
+            <a:prstGeom prst="line">
+              <a:avLst/>
+            </a:prstGeom>
+            <a:ln w="38100" cmpd="sng">
+              <a:solidFill>
+                <a:schemeClr val="tx1"/>
+              </a:solidFill>
+              <a:prstDash val="sysDot"/>
+            </a:ln>
+          </p:spPr>
+          <p:style>
+            <a:lnRef idx="1">
+              <a:schemeClr val="dk1"/>
+            </a:lnRef>
+            <a:fillRef idx="0">
+              <a:schemeClr val="dk1"/>
+            </a:fillRef>
+            <a:effectRef idx="0">
+              <a:schemeClr val="dk1"/>
+            </a:effectRef>
+            <a:fontRef idx="minor">
+              <a:schemeClr val="tx1"/>
+            </a:fontRef>
+          </p:style>
+        </p:cxnSp>
+        <p:sp>
+          <p:nvSpPr>
+            <p:cNvPr id="22" name="TextBox 21"/>
+            <p:cNvSpPr txBox="1"/>
+            <p:nvPr/>
+          </p:nvSpPr>
+          <p:spPr>
+            <a:xfrm>
+              <a:off x="10026915" y="1911046"/>
+              <a:ext cx="1071001" cy="307777"/>
+            </a:xfrm>
+            <a:prstGeom prst="rect">
+              <a:avLst/>
+            </a:prstGeom>
+            <a:noFill/>
+          </p:spPr>
+          <p:txBody>
+            <a:bodyPr wrap="square" rtlCol="0">
+              <a:spAutoFit/>
+            </a:bodyPr>
+            <a:lstStyle/>
+            <a:p>
+              <a:pPr algn="ctr"/>
+              <a:r>
+                <a:rPr lang="en-US" sz="1400" dirty="0"/>
+                <a:t>1 </a:t>
+              </a:r>
+              <a:r>
+                <a:rPr lang="en-US" sz="1400" dirty="0" err="1"/>
+                <a:t>Gbit</a:t>
+              </a:r>
+              <a:r>
+                <a:rPr lang="en-US" sz="1400" dirty="0"/>
+                <a:t>/s</a:t>
+              </a:r>
+              <a:endParaRPr lang="en-US" dirty="0"/>
+            </a:p>
+          </p:txBody>
+        </p:sp>
+        <p:sp>
+          <p:nvSpPr>
+            <p:cNvPr id="30" name="Rectangle 29"/>
+            <p:cNvSpPr/>
+            <p:nvPr/>
+          </p:nvSpPr>
+          <p:spPr>
+            <a:xfrm>
+              <a:off x="10171094" y="1356581"/>
+              <a:ext cx="801810" cy="280111"/>
+            </a:xfrm>
+            <a:prstGeom prst="rect">
+              <a:avLst/>
+            </a:prstGeom>
+            <a:ln>
+              <a:solidFill>
+                <a:schemeClr val="tx1"/>
+              </a:solidFill>
+            </a:ln>
+          </p:spPr>
+          <p:style>
+            <a:lnRef idx="2">
+              <a:schemeClr val="accent2">
+                <a:shade val="50000"/>
+              </a:schemeClr>
+            </a:lnRef>
+            <a:fillRef idx="1">
+              <a:schemeClr val="accent2"/>
+            </a:fillRef>
+            <a:effectRef idx="0">
+              <a:schemeClr val="accent2"/>
+            </a:effectRef>
+            <a:fontRef idx="minor">
+              <a:schemeClr val="lt1"/>
+            </a:fontRef>
+          </p:style>
+          <p:txBody>
+            <a:bodyPr rot="0" spcFirstLastPara="0" vertOverflow="overflow" horzOverflow="overflow" vert="horz" wrap="square" lIns="91440" tIns="45720" rIns="91440" bIns="45720" numCol="1" spcCol="0" rtlCol="0" fromWordArt="0" anchor="ctr" anchorCtr="0" forceAA="0" compatLnSpc="1">
+              <a:prstTxWarp prst="textNoShape">
+                <a:avLst/>
+              </a:prstTxWarp>
+              <a:noAutofit/>
+            </a:bodyPr>
+            <a:lstStyle/>
+            <a:p>
+              <a:pPr algn="ctr"/>
+              <a:r>
+                <a:rPr lang="en-US" sz="1600" dirty="0">
+                  <a:solidFill>
+                    <a:schemeClr val="tx1"/>
+                  </a:solidFill>
+                </a:rPr>
+                <a:t>Logger</a:t>
+              </a:r>
+            </a:p>
+          </p:txBody>
+        </p:sp>
+      </p:grpSp>
     </p:spTree>
     <p:extLst>
       <p:ext uri="{BB962C8B-B14F-4D97-AF65-F5344CB8AC3E}">
@@ -4500,20 +4955,26 @@
           <a:prstGeom prst="rect">
             <a:avLst/>
           </a:prstGeom>
-          <a:ln/>
+          <a:ln>
+            <a:solidFill>
+              <a:schemeClr val="tx1"/>
+            </a:solidFill>
+          </a:ln>
         </p:spPr>
         <p:style>
           <a:lnRef idx="2">
-            <a:schemeClr val="dk1"/>
+            <a:schemeClr val="accent4">
+              <a:shade val="50000"/>
+            </a:schemeClr>
           </a:lnRef>
           <a:fillRef idx="1">
-            <a:schemeClr val="lt1"/>
+            <a:schemeClr val="accent4"/>
           </a:fillRef>
           <a:effectRef idx="0">
-            <a:schemeClr val="dk1"/>
+            <a:schemeClr val="accent4"/>
           </a:effectRef>
           <a:fontRef idx="minor">
-            <a:schemeClr val="dk1"/>
+            <a:schemeClr val="lt1"/>
           </a:fontRef>
         </p:style>
         <p:txBody>
@@ -4562,20 +5023,26 @@
           <a:prstGeom prst="rect">
             <a:avLst/>
           </a:prstGeom>
-          <a:ln/>
+          <a:ln>
+            <a:solidFill>
+              <a:schemeClr val="tx1"/>
+            </a:solidFill>
+          </a:ln>
         </p:spPr>
         <p:style>
           <a:lnRef idx="2">
-            <a:schemeClr val="dk1"/>
+            <a:schemeClr val="accent4">
+              <a:shade val="50000"/>
+            </a:schemeClr>
           </a:lnRef>
           <a:fillRef idx="1">
-            <a:schemeClr val="lt1"/>
+            <a:schemeClr val="accent4"/>
           </a:fillRef>
           <a:effectRef idx="0">
-            <a:schemeClr val="dk1"/>
+            <a:schemeClr val="accent4"/>
           </a:effectRef>
           <a:fontRef idx="minor">
-            <a:schemeClr val="dk1"/>
+            <a:schemeClr val="lt1"/>
           </a:fontRef>
         </p:style>
         <p:txBody>
@@ -4640,20 +5107,26 @@
           <a:prstGeom prst="rect">
             <a:avLst/>
           </a:prstGeom>
-          <a:ln/>
+          <a:ln>
+            <a:solidFill>
+              <a:schemeClr val="tx1"/>
+            </a:solidFill>
+          </a:ln>
         </p:spPr>
         <p:style>
           <a:lnRef idx="2">
-            <a:schemeClr val="dk1"/>
+            <a:schemeClr val="accent6">
+              <a:shade val="50000"/>
+            </a:schemeClr>
           </a:lnRef>
           <a:fillRef idx="1">
-            <a:schemeClr val="lt1"/>
+            <a:schemeClr val="accent6"/>
           </a:fillRef>
           <a:effectRef idx="0">
-            <a:schemeClr val="dk1"/>
+            <a:schemeClr val="accent6"/>
           </a:effectRef>
           <a:fontRef idx="minor">
-            <a:schemeClr val="dk1"/>
+            <a:schemeClr val="lt1"/>
           </a:fontRef>
         </p:style>
         <p:txBody>
@@ -4672,7 +5145,7 @@
                   <a:schemeClr val="tx1"/>
                 </a:solidFill>
               </a:rPr>
-              <a:t>UDP Sender</a:t>
+              <a:t>Sender Node</a:t>
             </a:r>
           </a:p>
           <a:p>
@@ -4702,20 +5175,26 @@
           <a:prstGeom prst="rect">
             <a:avLst/>
           </a:prstGeom>
-          <a:ln/>
+          <a:ln>
+            <a:solidFill>
+              <a:schemeClr val="tx1"/>
+            </a:solidFill>
+          </a:ln>
         </p:spPr>
         <p:style>
           <a:lnRef idx="2">
-            <a:schemeClr val="dk1"/>
+            <a:schemeClr val="accent1">
+              <a:shade val="50000"/>
+            </a:schemeClr>
           </a:lnRef>
           <a:fillRef idx="1">
-            <a:schemeClr val="lt1"/>
+            <a:schemeClr val="accent1"/>
           </a:fillRef>
           <a:effectRef idx="0">
-            <a:schemeClr val="dk1"/>
+            <a:schemeClr val="accent1"/>
           </a:effectRef>
           <a:fontRef idx="minor">
-            <a:schemeClr val="dk1"/>
+            <a:schemeClr val="lt1"/>
           </a:fontRef>
         </p:style>
         <p:txBody>
@@ -4734,7 +5213,7 @@
                   <a:schemeClr val="tx1"/>
                 </a:solidFill>
               </a:rPr>
-              <a:t>UDP Echo</a:t>
+              <a:t>Receiver Node</a:t>
             </a:r>
           </a:p>
           <a:p>
@@ -4764,20 +5243,26 @@
           <a:prstGeom prst="rect">
             <a:avLst/>
           </a:prstGeom>
-          <a:ln/>
+          <a:ln>
+            <a:solidFill>
+              <a:schemeClr val="tx1"/>
+            </a:solidFill>
+          </a:ln>
         </p:spPr>
         <p:style>
           <a:lnRef idx="2">
-            <a:schemeClr val="dk1"/>
+            <a:schemeClr val="accent2">
+              <a:shade val="50000"/>
+            </a:schemeClr>
           </a:lnRef>
           <a:fillRef idx="1">
-            <a:schemeClr val="lt1"/>
+            <a:schemeClr val="accent2"/>
           </a:fillRef>
           <a:effectRef idx="0">
-            <a:schemeClr val="dk1"/>
+            <a:schemeClr val="accent2"/>
           </a:effectRef>
           <a:fontRef idx="minor">
-            <a:schemeClr val="dk1"/>
+            <a:schemeClr val="lt1"/>
           </a:fontRef>
         </p:style>
         <p:txBody>
@@ -5210,20 +5695,26 @@
           <a:prstGeom prst="rect">
             <a:avLst/>
           </a:prstGeom>
-          <a:ln/>
+          <a:ln>
+            <a:solidFill>
+              <a:schemeClr val="tx1"/>
+            </a:solidFill>
+          </a:ln>
         </p:spPr>
         <p:style>
           <a:lnRef idx="2">
-            <a:schemeClr val="dk1"/>
+            <a:schemeClr val="accent4">
+              <a:shade val="50000"/>
+            </a:schemeClr>
           </a:lnRef>
           <a:fillRef idx="1">
-            <a:schemeClr val="lt1"/>
+            <a:schemeClr val="accent4"/>
           </a:fillRef>
           <a:effectRef idx="0">
-            <a:schemeClr val="dk1"/>
+            <a:schemeClr val="accent4"/>
           </a:effectRef>
           <a:fontRef idx="minor">
-            <a:schemeClr val="dk1"/>
+            <a:schemeClr val="lt1"/>
           </a:fontRef>
         </p:style>
         <p:txBody>
@@ -5249,16 +5740,16 @@
       </p:sp>
       <p:grpSp>
         <p:nvGrpSpPr>
-          <p:cNvPr id="16" name="Group 15"/>
+          <p:cNvPr id="2" name="Group 1"/>
           <p:cNvGrpSpPr/>
           <p:nvPr/>
         </p:nvGrpSpPr>
         <p:grpSpPr>
           <a:xfrm>
-            <a:off x="550238" y="1506196"/>
-            <a:ext cx="10329524" cy="1867048"/>
-            <a:chOff x="172051" y="1506196"/>
-            <a:chExt cx="10329524" cy="1867048"/>
+            <a:off x="535370" y="1506196"/>
+            <a:ext cx="10359260" cy="1867048"/>
+            <a:chOff x="535370" y="1506196"/>
+            <a:chExt cx="10359260" cy="1867048"/>
           </a:xfrm>
         </p:grpSpPr>
         <p:sp>
@@ -5269,26 +5760,32 @@
           </p:nvSpPr>
           <p:spPr>
             <a:xfrm>
-              <a:off x="172051" y="2183890"/>
+              <a:off x="535370" y="2183890"/>
               <a:ext cx="1390049" cy="1189354"/>
             </a:xfrm>
             <a:prstGeom prst="rect">
               <a:avLst/>
             </a:prstGeom>
-            <a:ln/>
+            <a:ln>
+              <a:solidFill>
+                <a:schemeClr val="tx1"/>
+              </a:solidFill>
+            </a:ln>
           </p:spPr>
           <p:style>
             <a:lnRef idx="2">
-              <a:schemeClr val="dk1"/>
+              <a:schemeClr val="accent6">
+                <a:shade val="50000"/>
+              </a:schemeClr>
             </a:lnRef>
             <a:fillRef idx="1">
-              <a:schemeClr val="lt1"/>
+              <a:schemeClr val="accent6"/>
             </a:fillRef>
             <a:effectRef idx="0">
-              <a:schemeClr val="dk1"/>
+              <a:schemeClr val="accent6"/>
             </a:effectRef>
             <a:fontRef idx="minor">
-              <a:schemeClr val="dk1"/>
+              <a:schemeClr val="lt1"/>
             </a:fontRef>
           </p:style>
           <p:txBody>
@@ -5320,26 +5817,32 @@
           </p:nvSpPr>
           <p:spPr>
             <a:xfrm>
-              <a:off x="1670651" y="2183890"/>
+              <a:off x="2041404" y="2183890"/>
               <a:ext cx="1390049" cy="1189354"/>
             </a:xfrm>
             <a:prstGeom prst="rect">
               <a:avLst/>
             </a:prstGeom>
-            <a:ln/>
+            <a:ln>
+              <a:solidFill>
+                <a:schemeClr val="tx1"/>
+              </a:solidFill>
+            </a:ln>
           </p:spPr>
           <p:style>
             <a:lnRef idx="2">
-              <a:schemeClr val="dk1"/>
+              <a:schemeClr val="accent1">
+                <a:shade val="50000"/>
+              </a:schemeClr>
             </a:lnRef>
             <a:fillRef idx="1">
-              <a:schemeClr val="lt1"/>
+              <a:schemeClr val="accent1"/>
             </a:fillRef>
             <a:effectRef idx="0">
-              <a:schemeClr val="dk1"/>
+              <a:schemeClr val="accent1"/>
             </a:effectRef>
             <a:fontRef idx="minor">
-              <a:schemeClr val="dk1"/>
+              <a:schemeClr val="lt1"/>
             </a:fontRef>
           </p:style>
           <p:txBody>
@@ -5384,7 +5887,7 @@
           </p:nvCxnSpPr>
           <p:spPr>
             <a:xfrm>
-              <a:off x="863600" y="1506196"/>
+              <a:off x="1226919" y="1506196"/>
               <a:ext cx="3476" cy="677694"/>
             </a:xfrm>
             <a:prstGeom prst="line">
@@ -5422,7 +5925,7 @@
           </p:nvCxnSpPr>
           <p:spPr>
             <a:xfrm>
-              <a:off x="2362200" y="1506196"/>
+              <a:off x="2732953" y="1506196"/>
               <a:ext cx="3476" cy="677694"/>
             </a:xfrm>
             <a:prstGeom prst="line">
@@ -5458,26 +5961,32 @@
           </p:nvSpPr>
           <p:spPr>
             <a:xfrm>
-              <a:off x="3165776" y="2183890"/>
+              <a:off x="3543963" y="2183890"/>
               <a:ext cx="1390049" cy="1189354"/>
             </a:xfrm>
             <a:prstGeom prst="rect">
               <a:avLst/>
             </a:prstGeom>
-            <a:ln/>
+            <a:ln>
+              <a:solidFill>
+                <a:schemeClr val="tx1"/>
+              </a:solidFill>
+            </a:ln>
           </p:spPr>
           <p:style>
             <a:lnRef idx="2">
-              <a:schemeClr val="dk1"/>
+              <a:schemeClr val="accent1">
+                <a:shade val="50000"/>
+              </a:schemeClr>
             </a:lnRef>
             <a:fillRef idx="1">
-              <a:schemeClr val="lt1"/>
+              <a:schemeClr val="accent1"/>
             </a:fillRef>
             <a:effectRef idx="0">
-              <a:schemeClr val="dk1"/>
+              <a:schemeClr val="accent1"/>
             </a:effectRef>
             <a:fontRef idx="minor">
-              <a:schemeClr val="dk1"/>
+              <a:schemeClr val="lt1"/>
             </a:fontRef>
           </p:style>
           <p:txBody>
@@ -5522,7 +6031,7 @@
           </p:nvCxnSpPr>
           <p:spPr>
             <a:xfrm>
-              <a:off x="3857325" y="1506196"/>
+              <a:off x="4235512" y="1506196"/>
               <a:ext cx="3476" cy="677694"/>
             </a:xfrm>
             <a:prstGeom prst="line">
@@ -5558,26 +6067,32 @@
           </p:nvSpPr>
           <p:spPr>
             <a:xfrm>
-              <a:off x="4657426" y="2183890"/>
+              <a:off x="5035613" y="2183890"/>
               <a:ext cx="1390049" cy="1189354"/>
             </a:xfrm>
             <a:prstGeom prst="rect">
               <a:avLst/>
             </a:prstGeom>
-            <a:ln/>
+            <a:ln>
+              <a:solidFill>
+                <a:schemeClr val="tx1"/>
+              </a:solidFill>
+            </a:ln>
           </p:spPr>
           <p:style>
             <a:lnRef idx="2">
-              <a:schemeClr val="dk1"/>
+              <a:schemeClr val="accent1">
+                <a:shade val="50000"/>
+              </a:schemeClr>
             </a:lnRef>
             <a:fillRef idx="1">
-              <a:schemeClr val="lt1"/>
+              <a:schemeClr val="accent1"/>
             </a:fillRef>
             <a:effectRef idx="0">
-              <a:schemeClr val="dk1"/>
+              <a:schemeClr val="accent1"/>
             </a:effectRef>
             <a:fontRef idx="minor">
-              <a:schemeClr val="dk1"/>
+              <a:schemeClr val="lt1"/>
             </a:fontRef>
           </p:style>
           <p:txBody>
@@ -5622,7 +6137,7 @@
           </p:nvCxnSpPr>
           <p:spPr>
             <a:xfrm>
-              <a:off x="5348975" y="1506196"/>
+              <a:off x="5727162" y="1506196"/>
               <a:ext cx="3476" cy="677694"/>
             </a:xfrm>
             <a:prstGeom prst="line">
@@ -5658,26 +6173,32 @@
           </p:nvSpPr>
           <p:spPr>
             <a:xfrm>
-              <a:off x="6145601" y="2183890"/>
+              <a:off x="6531222" y="2183890"/>
               <a:ext cx="1390049" cy="1189354"/>
             </a:xfrm>
             <a:prstGeom prst="rect">
               <a:avLst/>
             </a:prstGeom>
-            <a:ln/>
+            <a:ln>
+              <a:solidFill>
+                <a:schemeClr val="tx1"/>
+              </a:solidFill>
+            </a:ln>
           </p:spPr>
           <p:style>
             <a:lnRef idx="2">
-              <a:schemeClr val="dk1"/>
+              <a:schemeClr val="accent1">
+                <a:shade val="50000"/>
+              </a:schemeClr>
             </a:lnRef>
             <a:fillRef idx="1">
-              <a:schemeClr val="lt1"/>
+              <a:schemeClr val="accent1"/>
             </a:fillRef>
             <a:effectRef idx="0">
-              <a:schemeClr val="dk1"/>
+              <a:schemeClr val="accent1"/>
             </a:effectRef>
             <a:fontRef idx="minor">
-              <a:schemeClr val="dk1"/>
+              <a:schemeClr val="lt1"/>
             </a:fontRef>
           </p:style>
           <p:txBody>
@@ -5722,7 +6243,7 @@
           </p:nvCxnSpPr>
           <p:spPr>
             <a:xfrm>
-              <a:off x="6837150" y="1506196"/>
+              <a:off x="7222771" y="1506196"/>
               <a:ext cx="3476" cy="677694"/>
             </a:xfrm>
             <a:prstGeom prst="line">
@@ -5758,26 +6279,32 @@
           </p:nvSpPr>
           <p:spPr>
             <a:xfrm>
-              <a:off x="7630301" y="2183890"/>
+              <a:off x="8023356" y="2183890"/>
               <a:ext cx="1390049" cy="1189354"/>
             </a:xfrm>
             <a:prstGeom prst="rect">
               <a:avLst/>
             </a:prstGeom>
-            <a:ln/>
+            <a:ln>
+              <a:solidFill>
+                <a:schemeClr val="tx1"/>
+              </a:solidFill>
+            </a:ln>
           </p:spPr>
           <p:style>
             <a:lnRef idx="2">
-              <a:schemeClr val="dk1"/>
+              <a:schemeClr val="accent1">
+                <a:shade val="50000"/>
+              </a:schemeClr>
             </a:lnRef>
             <a:fillRef idx="1">
-              <a:schemeClr val="lt1"/>
+              <a:schemeClr val="accent1"/>
             </a:fillRef>
             <a:effectRef idx="0">
-              <a:schemeClr val="dk1"/>
+              <a:schemeClr val="accent1"/>
             </a:effectRef>
             <a:fontRef idx="minor">
-              <a:schemeClr val="dk1"/>
+              <a:schemeClr val="lt1"/>
             </a:fontRef>
           </p:style>
           <p:txBody>
@@ -5822,7 +6349,7 @@
           </p:nvCxnSpPr>
           <p:spPr>
             <a:xfrm>
-              <a:off x="8321850" y="1506196"/>
+              <a:off x="8714905" y="1506196"/>
               <a:ext cx="3476" cy="677694"/>
             </a:xfrm>
             <a:prstGeom prst="line">
@@ -5858,26 +6385,32 @@
           </p:nvSpPr>
           <p:spPr>
             <a:xfrm>
-              <a:off x="9111526" y="2183890"/>
+              <a:off x="9504581" y="2183890"/>
               <a:ext cx="1390049" cy="1189354"/>
             </a:xfrm>
             <a:prstGeom prst="rect">
               <a:avLst/>
             </a:prstGeom>
-            <a:ln/>
+            <a:ln>
+              <a:solidFill>
+                <a:schemeClr val="tx1"/>
+              </a:solidFill>
+            </a:ln>
           </p:spPr>
           <p:style>
             <a:lnRef idx="2">
-              <a:schemeClr val="dk1"/>
+              <a:schemeClr val="accent1">
+                <a:shade val="50000"/>
+              </a:schemeClr>
             </a:lnRef>
             <a:fillRef idx="1">
-              <a:schemeClr val="lt1"/>
+              <a:schemeClr val="accent1"/>
             </a:fillRef>
             <a:effectRef idx="0">
-              <a:schemeClr val="dk1"/>
+              <a:schemeClr val="accent1"/>
             </a:effectRef>
             <a:fontRef idx="minor">
-              <a:schemeClr val="dk1"/>
+              <a:schemeClr val="lt1"/>
             </a:fontRef>
           </p:style>
           <p:txBody>
@@ -5922,7 +6455,7 @@
           </p:nvCxnSpPr>
           <p:spPr>
             <a:xfrm>
-              <a:off x="9803075" y="1506196"/>
+              <a:off x="10196130" y="1506196"/>
               <a:ext cx="3476" cy="677694"/>
             </a:xfrm>
             <a:prstGeom prst="line">

</xml_diff>

<commit_message>
changed "gap" to IPG since that seems to be the common abbrevation for inter-packet gap
</commit_message>
<xml_diff>
--- a/images/udp/graphics.pptx
+++ b/images/udp/graphics.pptx
@@ -246,7 +246,7 @@
           <a:p>
             <a:fld id="{D4F531F3-2A0A-480B-8977-C4D3915E765A}" type="datetimeFigureOut">
               <a:rPr lang="en-US" smtClean="0"/>
-              <a:t>11/12/2016</a:t>
+              <a:t>11/16/2016</a:t>
             </a:fld>
             <a:endParaRPr lang="en-US"/>
           </a:p>
@@ -416,7 +416,7 @@
           <a:p>
             <a:fld id="{D4F531F3-2A0A-480B-8977-C4D3915E765A}" type="datetimeFigureOut">
               <a:rPr lang="en-US" smtClean="0"/>
-              <a:t>11/12/2016</a:t>
+              <a:t>11/16/2016</a:t>
             </a:fld>
             <a:endParaRPr lang="en-US"/>
           </a:p>
@@ -596,7 +596,7 @@
           <a:p>
             <a:fld id="{D4F531F3-2A0A-480B-8977-C4D3915E765A}" type="datetimeFigureOut">
               <a:rPr lang="en-US" smtClean="0"/>
-              <a:t>11/12/2016</a:t>
+              <a:t>11/16/2016</a:t>
             </a:fld>
             <a:endParaRPr lang="en-US"/>
           </a:p>
@@ -766,7 +766,7 @@
           <a:p>
             <a:fld id="{D4F531F3-2A0A-480B-8977-C4D3915E765A}" type="datetimeFigureOut">
               <a:rPr lang="en-US" smtClean="0"/>
-              <a:t>11/12/2016</a:t>
+              <a:t>11/16/2016</a:t>
             </a:fld>
             <a:endParaRPr lang="en-US"/>
           </a:p>
@@ -1012,7 +1012,7 @@
           <a:p>
             <a:fld id="{D4F531F3-2A0A-480B-8977-C4D3915E765A}" type="datetimeFigureOut">
               <a:rPr lang="en-US" smtClean="0"/>
-              <a:t>11/12/2016</a:t>
+              <a:t>11/16/2016</a:t>
             </a:fld>
             <a:endParaRPr lang="en-US"/>
           </a:p>
@@ -1244,7 +1244,7 @@
           <a:p>
             <a:fld id="{D4F531F3-2A0A-480B-8977-C4D3915E765A}" type="datetimeFigureOut">
               <a:rPr lang="en-US" smtClean="0"/>
-              <a:t>11/12/2016</a:t>
+              <a:t>11/16/2016</a:t>
             </a:fld>
             <a:endParaRPr lang="en-US"/>
           </a:p>
@@ -1611,7 +1611,7 @@
           <a:p>
             <a:fld id="{D4F531F3-2A0A-480B-8977-C4D3915E765A}" type="datetimeFigureOut">
               <a:rPr lang="en-US" smtClean="0"/>
-              <a:t>11/12/2016</a:t>
+              <a:t>11/16/2016</a:t>
             </a:fld>
             <a:endParaRPr lang="en-US"/>
           </a:p>
@@ -1729,7 +1729,7 @@
           <a:p>
             <a:fld id="{D4F531F3-2A0A-480B-8977-C4D3915E765A}" type="datetimeFigureOut">
               <a:rPr lang="en-US" smtClean="0"/>
-              <a:t>11/12/2016</a:t>
+              <a:t>11/16/2016</a:t>
             </a:fld>
             <a:endParaRPr lang="en-US"/>
           </a:p>
@@ -1824,7 +1824,7 @@
           <a:p>
             <a:fld id="{D4F531F3-2A0A-480B-8977-C4D3915E765A}" type="datetimeFigureOut">
               <a:rPr lang="en-US" smtClean="0"/>
-              <a:t>11/12/2016</a:t>
+              <a:t>11/16/2016</a:t>
             </a:fld>
             <a:endParaRPr lang="en-US"/>
           </a:p>
@@ -2101,7 +2101,7 @@
           <a:p>
             <a:fld id="{D4F531F3-2A0A-480B-8977-C4D3915E765A}" type="datetimeFigureOut">
               <a:rPr lang="en-US" smtClean="0"/>
-              <a:t>11/12/2016</a:t>
+              <a:t>11/16/2016</a:t>
             </a:fld>
             <a:endParaRPr lang="en-US"/>
           </a:p>
@@ -2358,7 +2358,7 @@
           <a:p>
             <a:fld id="{D4F531F3-2A0A-480B-8977-C4D3915E765A}" type="datetimeFigureOut">
               <a:rPr lang="en-US" smtClean="0"/>
-              <a:t>11/12/2016</a:t>
+              <a:t>11/16/2016</a:t>
             </a:fld>
             <a:endParaRPr lang="en-US"/>
           </a:p>
@@ -2571,7 +2571,7 @@
           <a:p>
             <a:fld id="{D4F531F3-2A0A-480B-8977-C4D3915E765A}" type="datetimeFigureOut">
               <a:rPr lang="en-US" smtClean="0"/>
-              <a:t>11/12/2016</a:t>
+              <a:t>11/16/2016</a:t>
             </a:fld>
             <a:endParaRPr lang="en-US"/>
           </a:p>
@@ -3270,7 +3270,7 @@
                     <a:schemeClr val="tx1"/>
                   </a:solidFill>
                 </a:rPr>
-                <a:t>Gap</a:t>
+                <a:t>IPG</a:t>
               </a:r>
             </a:p>
           </p:txBody>

</xml_diff>